<commit_message>
changed slide 19 of this presentation
</commit_message>
<xml_diff>
--- a/Git.pptx
+++ b/Git.pptx
@@ -5,7 +5,7 @@
     <p:sldMasterId id="2147483672" r:id="rId1"/>
   </p:sldMasterIdLst>
   <p:notesMasterIdLst>
-    <p:notesMasterId r:id="rId20"/>
+    <p:notesMasterId r:id="rId21"/>
   </p:notesMasterIdLst>
   <p:sldIdLst>
     <p:sldId id="256" r:id="rId2"/>
@@ -26,6 +26,7 @@
     <p:sldId id="273" r:id="rId17"/>
     <p:sldId id="268" r:id="rId18"/>
     <p:sldId id="274" r:id="rId19"/>
+    <p:sldId id="275" r:id="rId20"/>
   </p:sldIdLst>
   <p:sldSz cx="9144000" cy="5143500" type="screen16x9"/>
   <p:notesSz cx="6858000" cy="9144000"/>
@@ -209,7 +210,7 @@
           <a:p>
             <a:fld id="{33381547-05E0-4487-994A-7D9BB6110CE3}" type="datetimeFigureOut">
               <a:rPr lang="en-US" smtClean="0"/>
-              <a:t>2/18/2018</a:t>
+              <a:t>2/19/2018</a:t>
             </a:fld>
             <a:endParaRPr lang="en-US"/>
           </a:p>
@@ -742,7 +743,7 @@
           <a:p>
             <a:fld id="{9BCAFB3A-A201-4A81-9A62-D67F100AA58A}" type="datetime1">
               <a:rPr lang="en-US" smtClean="0"/>
-              <a:t>2/18/2018</a:t>
+              <a:t>2/19/2018</a:t>
             </a:fld>
             <a:endParaRPr lang="en-US"/>
           </a:p>
@@ -943,7 +944,7 @@
           <a:p>
             <a:fld id="{7DE11374-A2B7-41AE-8033-2A16C9C315BE}" type="datetime1">
               <a:rPr lang="en-US" smtClean="0"/>
-              <a:t>2/18/2018</a:t>
+              <a:t>2/19/2018</a:t>
             </a:fld>
             <a:endParaRPr lang="en-US"/>
           </a:p>
@@ -1127,7 +1128,7 @@
           <a:p>
             <a:fld id="{003CE860-CDE9-47FD-8961-B87204FCAED0}" type="datetime1">
               <a:rPr lang="en-US" smtClean="0"/>
-              <a:t>2/18/2018</a:t>
+              <a:t>2/19/2018</a:t>
             </a:fld>
             <a:endParaRPr lang="en-US"/>
           </a:p>
@@ -1301,7 +1302,7 @@
           <a:p>
             <a:fld id="{D8B373B7-2714-496B-AC7F-949877B4F04A}" type="datetime1">
               <a:rPr lang="en-US" smtClean="0"/>
-              <a:t>2/18/2018</a:t>
+              <a:t>2/19/2018</a:t>
             </a:fld>
             <a:endParaRPr lang="en-US"/>
           </a:p>
@@ -1568,7 +1569,7 @@
           <a:p>
             <a:fld id="{CE745D14-7FA3-4662-9503-1B536274C00A}" type="datetime1">
               <a:rPr lang="en-US" smtClean="0"/>
-              <a:t>2/18/2018</a:t>
+              <a:t>2/19/2018</a:t>
             </a:fld>
             <a:endParaRPr lang="en-US"/>
           </a:p>
@@ -1860,7 +1861,7 @@
           <a:p>
             <a:fld id="{5478B0EB-2A72-4F43-8CAF-C7440ACC774F}" type="datetime1">
               <a:rPr lang="en-US" smtClean="0"/>
-              <a:t>2/18/2018</a:t>
+              <a:t>2/19/2018</a:t>
             </a:fld>
             <a:endParaRPr lang="en-US"/>
           </a:p>
@@ -2286,7 +2287,7 @@
           <a:p>
             <a:fld id="{BDCE1369-2FAE-4E88-8050-2E85AAD4F3EE}" type="datetime1">
               <a:rPr lang="en-US" smtClean="0"/>
-              <a:t>2/18/2018</a:t>
+              <a:t>2/19/2018</a:t>
             </a:fld>
             <a:endParaRPr lang="en-US"/>
           </a:p>
@@ -2408,7 +2409,7 @@
           <a:p>
             <a:fld id="{D69F136B-23D8-48FB-9D2C-09343557A784}" type="datetime1">
               <a:rPr lang="en-US" smtClean="0"/>
-              <a:t>2/18/2018</a:t>
+              <a:t>2/19/2018</a:t>
             </a:fld>
             <a:endParaRPr lang="en-US"/>
           </a:p>
@@ -2507,7 +2508,7 @@
           <a:p>
             <a:fld id="{B483751E-F4AA-4B81-94CB-B8B399EAF121}" type="datetime1">
               <a:rPr lang="en-US" smtClean="0"/>
-              <a:t>2/18/2018</a:t>
+              <a:t>2/19/2018</a:t>
             </a:fld>
             <a:endParaRPr lang="en-US"/>
           </a:p>
@@ -2788,7 +2789,7 @@
           <a:p>
             <a:fld id="{BBEC857F-B6C9-4254-A48F-750DB237DE80}" type="datetime1">
               <a:rPr lang="en-US" smtClean="0"/>
-              <a:t>2/18/2018</a:t>
+              <a:t>2/19/2018</a:t>
             </a:fld>
             <a:endParaRPr lang="en-US"/>
           </a:p>
@@ -3045,7 +3046,7 @@
           <a:p>
             <a:fld id="{E80361DC-3236-4346-B2E8-A2F97BA13056}" type="datetime1">
               <a:rPr lang="en-US" smtClean="0"/>
-              <a:t>2/18/2018</a:t>
+              <a:t>2/19/2018</a:t>
             </a:fld>
             <a:endParaRPr lang="en-US"/>
           </a:p>
@@ -3312,7 +3313,7 @@
           <a:p>
             <a:fld id="{7499E6B1-3F41-4666-B376-B8EF3143577A}" type="datetime1">
               <a:rPr lang="en-US" smtClean="0"/>
-              <a:t>2/18/2018</a:t>
+              <a:t>2/19/2018</a:t>
             </a:fld>
             <a:endParaRPr lang="en-US"/>
           </a:p>
@@ -6835,6 +6836,104 @@
 </p:sld>
 </file>
 
+<file path=ppt/slides/slide19.xml><?xml version="1.0" encoding="utf-8"?>
+<p:sld xmlns:a="http://schemas.openxmlformats.org/drawingml/2006/main" xmlns:r="http://schemas.openxmlformats.org/officeDocument/2006/relationships" xmlns:p="http://schemas.openxmlformats.org/presentationml/2006/main">
+  <p:cSld>
+    <p:spTree>
+      <p:nvGrpSpPr>
+        <p:cNvPr id="1" name=""/>
+        <p:cNvGrpSpPr/>
+        <p:nvPr/>
+      </p:nvGrpSpPr>
+      <p:grpSpPr>
+        <a:xfrm>
+          <a:off x="0" y="0"/>
+          <a:ext cx="0" cy="0"/>
+          <a:chOff x="0" y="0"/>
+          <a:chExt cx="0" cy="0"/>
+        </a:xfrm>
+      </p:grpSpPr>
+      <p:sp>
+        <p:nvSpPr>
+          <p:cNvPr id="2" name="Titel 1"/>
+          <p:cNvSpPr>
+            <a:spLocks noGrp="1"/>
+          </p:cNvSpPr>
+          <p:nvPr>
+            <p:ph type="title"/>
+          </p:nvPr>
+        </p:nvSpPr>
+        <p:spPr/>
+        <p:txBody>
+          <a:bodyPr/>
+          <a:lstStyle/>
+          <a:p>
+            <a:endParaRPr lang="de-DE"/>
+          </a:p>
+        </p:txBody>
+      </p:sp>
+      <p:sp>
+        <p:nvSpPr>
+          <p:cNvPr id="3" name="Inhaltsplatzhalter 2"/>
+          <p:cNvSpPr>
+            <a:spLocks noGrp="1"/>
+          </p:cNvSpPr>
+          <p:nvPr>
+            <p:ph idx="1"/>
+          </p:nvPr>
+        </p:nvSpPr>
+        <p:spPr/>
+        <p:txBody>
+          <a:bodyPr/>
+          <a:lstStyle/>
+          <a:p>
+            <a:endParaRPr lang="de-DE"/>
+          </a:p>
+        </p:txBody>
+      </p:sp>
+      <p:sp>
+        <p:nvSpPr>
+          <p:cNvPr id="4" name="Fußzeilenplatzhalter 3"/>
+          <p:cNvSpPr>
+            <a:spLocks noGrp="1"/>
+          </p:cNvSpPr>
+          <p:nvPr>
+            <p:ph type="ftr" sz="quarter" idx="11"/>
+          </p:nvPr>
+        </p:nvSpPr>
+        <p:spPr/>
+        <p:txBody>
+          <a:bodyPr/>
+          <a:lstStyle/>
+          <a:p>
+            <a:r>
+              <a:rPr lang="en-US" smtClean="0"/>
+              <a:t>TU Dresden – Robolab 2018</a:t>
+            </a:r>
+            <a:endParaRPr lang="en-US" dirty="0"/>
+          </a:p>
+        </p:txBody>
+      </p:sp>
+    </p:spTree>
+    <p:extLst>
+      <p:ext uri="{BB962C8B-B14F-4D97-AF65-F5344CB8AC3E}">
+        <p14:creationId xmlns:p14="http://schemas.microsoft.com/office/powerpoint/2010/main" val="915991720"/>
+      </p:ext>
+    </p:extLst>
+  </p:cSld>
+  <p:clrMapOvr>
+    <a:masterClrMapping/>
+  </p:clrMapOvr>
+  <p:timing>
+    <p:tnLst>
+      <p:par>
+        <p:cTn id="1" dur="indefinite" restart="never" nodeType="tmRoot"/>
+      </p:par>
+    </p:tnLst>
+  </p:timing>
+</p:sld>
+</file>
+
 <file path=ppt/slides/slide2.xml><?xml version="1.0" encoding="utf-8"?>
 <p:sld xmlns:a="http://schemas.openxmlformats.org/drawingml/2006/main" xmlns:r="http://schemas.openxmlformats.org/officeDocument/2006/relationships" xmlns:p="http://schemas.openxmlformats.org/presentationml/2006/main">
   <p:cSld>
@@ -6969,7 +7068,6 @@
               <a:rPr lang="de-DE" dirty="0" smtClean="0"/>
               <a:t> im Praktikum</a:t>
             </a:r>
-            <a:endParaRPr lang="de-DE" dirty="0" smtClean="0"/>
           </a:p>
         </p:txBody>
       </p:sp>
@@ -7144,11 +7242,7 @@
             </a:r>
             <a:r>
               <a:rPr lang="en-US" sz="2800" dirty="0" smtClean="0"/>
-              <a:t> </a:t>
-            </a:r>
-            <a:r>
-              <a:rPr lang="en-US" sz="2800" dirty="0" smtClean="0"/>
-              <a:t>SE </a:t>
+              <a:t> SE </a:t>
             </a:r>
             <a:r>
               <a:rPr lang="de-DE" sz="2800" dirty="0" smtClean="0"/>
@@ -7259,7 +7353,15 @@
                   <a:srgbClr val="FFFF00"/>
                 </a:solidFill>
               </a:rPr>
-              <a:t>man </a:t>
+              <a:t>man am </a:t>
+            </a:r>
+            <a:r>
+              <a:rPr lang="de-DE" sz="2800" dirty="0" smtClean="0">
+                <a:solidFill>
+                  <a:srgbClr val="FFFF00"/>
+                </a:solidFill>
+              </a:rPr>
+              <a:t>besten</a:t>
             </a:r>
             <a:r>
               <a:rPr lang="en-US" sz="2800" dirty="0" smtClean="0">
@@ -7267,31 +7369,7 @@
                   <a:srgbClr val="FFFF00"/>
                 </a:solidFill>
               </a:rPr>
-              <a:t>am </a:t>
-            </a:r>
-            <a:r>
-              <a:rPr lang="de-DE" sz="2800" dirty="0" smtClean="0">
-                <a:solidFill>
-                  <a:srgbClr val="FFFF00"/>
-                </a:solidFill>
-              </a:rPr>
-              <a:t>besten</a:t>
-            </a:r>
-            <a:r>
-              <a:rPr lang="en-US" sz="2800" dirty="0" smtClean="0">
-                <a:solidFill>
-                  <a:srgbClr val="FFFF00"/>
-                </a:solidFill>
-              </a:rPr>
-              <a:t> </a:t>
-            </a:r>
-            <a:r>
-              <a:rPr lang="en-US" sz="2800" dirty="0" smtClean="0">
-                <a:solidFill>
-                  <a:srgbClr val="FFFF00"/>
-                </a:solidFill>
-              </a:rPr>
-              <a:t>die Codebase?</a:t>
+              <a:t> die Codebase?</a:t>
             </a:r>
             <a:endParaRPr lang="en-US" sz="2800" dirty="0">
               <a:solidFill>
@@ -7598,11 +7676,7 @@
             </a:r>
             <a:r>
               <a:rPr lang="en-US" sz="4000" dirty="0" smtClean="0"/>
-              <a:t> der </a:t>
-            </a:r>
-            <a:r>
-              <a:rPr lang="en-US" sz="4000" dirty="0" smtClean="0"/>
-              <a:t>“</a:t>
+              <a:t> der “</a:t>
             </a:r>
             <a:r>
               <a:rPr lang="de-DE" sz="4000" dirty="0" smtClean="0"/>
@@ -7691,7 +7765,6 @@
               <a:rPr lang="en-US" sz="2800" dirty="0" smtClean="0"/>
               <a:t>?</a:t>
             </a:r>
-            <a:endParaRPr lang="en-US" sz="2800" dirty="0" smtClean="0"/>
           </a:p>
           <a:p>
             <a:pPr marL="457200" indent="-457200">

</xml_diff>

<commit_message>
overhaul on all slides
</commit_message>
<xml_diff>
--- a/Git.pptx
+++ b/Git.pptx
@@ -5,7 +5,7 @@
     <p:sldMasterId id="2147483672" r:id="rId1"/>
   </p:sldMasterIdLst>
   <p:notesMasterIdLst>
-    <p:notesMasterId r:id="rId26"/>
+    <p:notesMasterId r:id="rId28"/>
   </p:notesMasterIdLst>
   <p:sldIdLst>
     <p:sldId id="256" r:id="rId2"/>
@@ -30,8 +30,10 @@
     <p:sldId id="276" r:id="rId21"/>
     <p:sldId id="280" r:id="rId22"/>
     <p:sldId id="279" r:id="rId23"/>
-    <p:sldId id="278" r:id="rId24"/>
-    <p:sldId id="277" r:id="rId25"/>
+    <p:sldId id="281" r:id="rId24"/>
+    <p:sldId id="278" r:id="rId25"/>
+    <p:sldId id="282" r:id="rId26"/>
+    <p:sldId id="277" r:id="rId27"/>
   </p:sldIdLst>
   <p:sldSz cx="9144000" cy="5143500" type="screen16x9"/>
   <p:notesSz cx="6858000" cy="9144000"/>
@@ -4221,11 +4223,7 @@
             </a:r>
             <a:r>
               <a:rPr lang="de-DE" sz="2400" dirty="0" smtClean="0"/>
-              <a:t> im </a:t>
-            </a:r>
-            <a:r>
-              <a:rPr lang="de-DE" sz="2400" dirty="0" smtClean="0"/>
-              <a:t>Arbeitsverzeichnis</a:t>
+              <a:t> im Arbeitsverzeichnis</a:t>
             </a:r>
           </a:p>
           <a:p>
@@ -4238,11 +4236,7 @@
             </a:pPr>
             <a:r>
               <a:rPr lang="de-DE" sz="2400" dirty="0" smtClean="0"/>
-              <a:t>jetzt </a:t>
-            </a:r>
-            <a:r>
-              <a:rPr lang="de-DE" sz="2400" dirty="0" smtClean="0"/>
-              <a:t>können Dateien zum </a:t>
+              <a:t>jetzt können Dateien zum </a:t>
             </a:r>
             <a:r>
               <a:rPr lang="de-DE" sz="2400" dirty="0" smtClean="0">
@@ -4295,7 +4289,15 @@
             </a:r>
             <a:r>
               <a:rPr lang="en-US" sz="2400" dirty="0" err="1" smtClean="0"/>
-              <a:t>Dateien</a:t>
+              <a:t>im</a:t>
+            </a:r>
+            <a:r>
+              <a:rPr lang="en-US" sz="2400" dirty="0" smtClean="0"/>
+              <a:t> Index </a:t>
+            </a:r>
+            <a:r>
+              <a:rPr lang="en-US" sz="2400" dirty="0" err="1" smtClean="0"/>
+              <a:t>befindlichen</a:t>
             </a:r>
             <a:r>
               <a:rPr lang="en-US" sz="2400" dirty="0" smtClean="0"/>
@@ -4303,11 +4305,7 @@
             </a:r>
             <a:r>
               <a:rPr lang="en-US" sz="2400" dirty="0" err="1" smtClean="0"/>
-              <a:t>im</a:t>
-            </a:r>
-            <a:r>
-              <a:rPr lang="en-US" sz="2400" dirty="0" smtClean="0"/>
-              <a:t> Index</a:t>
+              <a:t>Dateien</a:t>
             </a:r>
             <a:endParaRPr lang="de-DE" sz="2400" dirty="0" smtClean="0"/>
           </a:p>
@@ -4577,8 +4575,8 @@
         </p:nvSpPr>
         <p:spPr>
           <a:xfrm>
-            <a:off x="6908584" y="2145982"/>
-            <a:ext cx="1672389" cy="646331"/>
+            <a:off x="6908584" y="2140445"/>
+            <a:ext cx="2159216" cy="646331"/>
           </a:xfrm>
           <a:prstGeom prst="rect">
             <a:avLst/>
@@ -4610,22 +4608,23 @@
               </a:rPr>
               <a:t> </a:t>
             </a:r>
-            <a:br>
+            <a:r>
+              <a:rPr lang="de-DE" dirty="0" err="1" smtClean="0">
+                <a:solidFill>
+                  <a:schemeClr val="bg1"/>
+                </a:solidFill>
+                <a:latin typeface="Bahnschrift Light" panose="020B0502040204020203" pitchFamily="34" charset="0"/>
+              </a:rPr>
+              <a:t>branch</a:t>
+            </a:r>
+            <a:r>
               <a:rPr lang="de-DE" dirty="0" smtClean="0">
                 <a:solidFill>
                   <a:schemeClr val="bg1"/>
                 </a:solidFill>
                 <a:latin typeface="Bahnschrift Light" panose="020B0502040204020203" pitchFamily="34" charset="0"/>
               </a:rPr>
-            </a:br>
-            <a:r>
-              <a:rPr lang="de-DE" dirty="0" err="1" smtClean="0">
-                <a:solidFill>
-                  <a:schemeClr val="bg1"/>
-                </a:solidFill>
-                <a:latin typeface="Bahnschrift Light" panose="020B0502040204020203" pitchFamily="34" charset="0"/>
-              </a:rPr>
-              <a:t>branch</a:t>
+              <a:t> (dazu gleich mehr)</a:t>
             </a:r>
             <a:endParaRPr lang="de-DE" dirty="0" smtClean="0">
               <a:solidFill>
@@ -4639,13 +4638,15 @@
       <p:cxnSp>
         <p:nvCxnSpPr>
           <p:cNvPr id="7" name="Gekrümmte Verbindung 6"/>
-          <p:cNvCxnSpPr/>
+          <p:cNvCxnSpPr>
+            <a:endCxn id="6" idx="2"/>
+          </p:cNvCxnSpPr>
           <p:nvPr/>
         </p:nvCxnSpPr>
         <p:spPr>
           <a:xfrm flipV="1">
-            <a:off x="6084194" y="2792313"/>
-            <a:ext cx="1648779" cy="693839"/>
+            <a:off x="6084194" y="2786776"/>
+            <a:ext cx="1903998" cy="699377"/>
           </a:xfrm>
           <a:prstGeom prst="curvedConnector2">
             <a:avLst/>
@@ -4875,7 +4876,6 @@
               <a:rPr lang="de-DE" sz="2400" dirty="0" smtClean="0"/>
               <a:t>kann am Projekt gearbeitet werden</a:t>
             </a:r>
-            <a:endParaRPr lang="de-DE" sz="2400" dirty="0" smtClean="0"/>
           </a:p>
           <a:p>
             <a:pPr marL="457200" indent="-457200">
@@ -4920,15 +4920,7 @@
             </a:r>
             <a:r>
               <a:rPr lang="de-DE" sz="2400" dirty="0" smtClean="0"/>
-              <a:t> </a:t>
-            </a:r>
-            <a:r>
-              <a:rPr lang="de-DE" sz="2400" dirty="0" smtClean="0"/>
-              <a:t>im </a:t>
-            </a:r>
-            <a:r>
-              <a:rPr lang="de-DE" sz="2400" dirty="0" smtClean="0"/>
-              <a:t>Arbeitsverzeichnis</a:t>
+              <a:t> im Arbeitsverzeichnis</a:t>
             </a:r>
           </a:p>
           <a:p>
@@ -4941,7 +4933,31 @@
             </a:pPr>
             <a:r>
               <a:rPr lang="de-DE" sz="2400" dirty="0" smtClean="0"/>
-              <a:t>Änderungen können dann veröffentlicht werden</a:t>
+              <a:t>Änderungen </a:t>
+            </a:r>
+            <a:r>
+              <a:rPr lang="de-DE" sz="2400" dirty="0" smtClean="0"/>
+              <a:t>können </a:t>
+            </a:r>
+            <a:r>
+              <a:rPr lang="de-DE" sz="2400" dirty="0" smtClean="0"/>
+              <a:t>dann </a:t>
+            </a:r>
+            <a:r>
+              <a:rPr lang="de-DE" sz="2400" dirty="0" smtClean="0">
+                <a:solidFill>
+                  <a:srgbClr val="81D4FA"/>
+                </a:solidFill>
+              </a:rPr>
+              <a:t>veröffentlicht</a:t>
+            </a:r>
+            <a:r>
+              <a:rPr lang="de-DE" sz="2400" dirty="0" smtClean="0"/>
+              <a:t> </a:t>
+            </a:r>
+            <a:r>
+              <a:rPr lang="de-DE" sz="2400" dirty="0" smtClean="0"/>
+              <a:t>werden</a:t>
             </a:r>
           </a:p>
           <a:p>
@@ -4953,10 +4969,86 @@
               <a:buChar char="•"/>
             </a:pPr>
             <a:r>
-              <a:rPr lang="de-DE" sz="2400" dirty="0" smtClean="0"/>
-              <a:t>Änderungen anderer Entwickler können lokal eingepflegt werden</a:t>
-            </a:r>
-            <a:endParaRPr lang="de-DE" sz="2400" dirty="0"/>
+              <a:rPr lang="en-US" sz="2400" dirty="0" smtClean="0">
+                <a:solidFill>
+                  <a:srgbClr val="81D4FA"/>
+                </a:solidFill>
+              </a:rPr>
+              <a:t>add</a:t>
+            </a:r>
+            <a:r>
+              <a:rPr lang="en-US" sz="2400" dirty="0" smtClean="0"/>
+              <a:t>, </a:t>
+            </a:r>
+            <a:r>
+              <a:rPr lang="en-US" sz="2400" dirty="0" smtClean="0">
+                <a:solidFill>
+                  <a:srgbClr val="81D4FA"/>
+                </a:solidFill>
+              </a:rPr>
+              <a:t>commit</a:t>
+            </a:r>
+            <a:r>
+              <a:rPr lang="en-US" sz="2400" dirty="0" smtClean="0"/>
+              <a:t>, </a:t>
+            </a:r>
+            <a:r>
+              <a:rPr lang="en-US" sz="2400" dirty="0" smtClean="0">
+                <a:solidFill>
+                  <a:srgbClr val="81D4FA"/>
+                </a:solidFill>
+              </a:rPr>
+              <a:t>branch</a:t>
+            </a:r>
+            <a:r>
+              <a:rPr lang="en-US" sz="2400" dirty="0" smtClean="0"/>
+              <a:t>, </a:t>
+            </a:r>
+            <a:r>
+              <a:rPr lang="en-US" sz="2400" dirty="0" smtClean="0">
+                <a:solidFill>
+                  <a:srgbClr val="81D4FA"/>
+                </a:solidFill>
+              </a:rPr>
+              <a:t>push</a:t>
+            </a:r>
+            <a:r>
+              <a:rPr lang="en-US" sz="2400" dirty="0" smtClean="0"/>
+              <a:t> und </a:t>
+            </a:r>
+            <a:r>
+              <a:rPr lang="en-US" sz="2400" dirty="0" smtClean="0">
+                <a:solidFill>
+                  <a:srgbClr val="81D4FA"/>
+                </a:solidFill>
+              </a:rPr>
+              <a:t>pull</a:t>
+            </a:r>
+            <a:r>
+              <a:rPr lang="en-US" sz="2400" dirty="0" smtClean="0"/>
+              <a:t> </a:t>
+            </a:r>
+            <a:r>
+              <a:rPr lang="en-US" sz="2400" dirty="0" err="1" smtClean="0"/>
+              <a:t>sind</a:t>
+            </a:r>
+            <a:r>
+              <a:rPr lang="en-US" sz="2400" dirty="0" smtClean="0"/>
+              <a:t> </a:t>
+            </a:r>
+            <a:r>
+              <a:rPr lang="en-US" sz="2400" dirty="0" err="1" smtClean="0"/>
+              <a:t>elementare</a:t>
+            </a:r>
+            <a:r>
+              <a:rPr lang="en-US" sz="2400" dirty="0" smtClean="0"/>
+              <a:t> </a:t>
+            </a:r>
+            <a:r>
+              <a:rPr lang="en-US" sz="2400" dirty="0" err="1" smtClean="0"/>
+              <a:t>Befehle</a:t>
+            </a:r>
+            <a:endParaRPr lang="de-DE" sz="2400" dirty="0" smtClean="0"/>
           </a:p>
         </p:txBody>
       </p:sp>
@@ -5079,12 +5171,16 @@
               <a:buChar char="•"/>
             </a:pPr>
             <a:r>
+              <a:rPr lang="de-DE" sz="2400" dirty="0" smtClean="0">
+                <a:solidFill>
+                  <a:srgbClr val="81D4FA"/>
+                </a:solidFill>
+              </a:rPr>
+              <a:t>Zusammenfassung</a:t>
+            </a:r>
+            <a:r>
               <a:rPr lang="de-DE" sz="2400" dirty="0" smtClean="0"/>
-              <a:t>Zusammenfassung der </a:t>
-            </a:r>
-            <a:r>
-              <a:rPr lang="de-DE" sz="2400" dirty="0" smtClean="0"/>
-              <a:t>Änderungen seit letztem </a:t>
+              <a:t> der Änderungen seit letztem </a:t>
             </a:r>
             <a:r>
               <a:rPr lang="de-DE" sz="2400" dirty="0" err="1" smtClean="0"/>
@@ -5102,11 +5198,43 @@
             </a:pPr>
             <a:r>
               <a:rPr lang="de-DE" sz="2400" dirty="0" smtClean="0"/>
-              <a:t>Listet neue</a:t>
+              <a:t>Listet </a:t>
+            </a:r>
+            <a:r>
+              <a:rPr lang="de-DE" sz="2400" dirty="0" smtClean="0">
+                <a:solidFill>
+                  <a:srgbClr val="81D4FA"/>
+                </a:solidFill>
+              </a:rPr>
+              <a:t>neue</a:t>
             </a:r>
             <a:r>
               <a:rPr lang="de-DE" sz="2400" dirty="0" smtClean="0"/>
-              <a:t>, gelöschte und geänderte Dateien auf</a:t>
+              <a:t>, </a:t>
+            </a:r>
+            <a:r>
+              <a:rPr lang="de-DE" sz="2400" dirty="0" smtClean="0">
+                <a:solidFill>
+                  <a:srgbClr val="81D4FA"/>
+                </a:solidFill>
+              </a:rPr>
+              <a:t>gelöschte</a:t>
+            </a:r>
+            <a:r>
+              <a:rPr lang="de-DE" sz="2400" dirty="0" smtClean="0"/>
+              <a:t> und </a:t>
+            </a:r>
+            <a:r>
+              <a:rPr lang="de-DE" sz="2400" dirty="0" smtClean="0">
+                <a:solidFill>
+                  <a:srgbClr val="81D4FA"/>
+                </a:solidFill>
+              </a:rPr>
+              <a:t>geänderte</a:t>
+            </a:r>
+            <a:r>
+              <a:rPr lang="de-DE" sz="2400" dirty="0" smtClean="0"/>
+              <a:t> Dateien auf</a:t>
             </a:r>
           </a:p>
           <a:p>
@@ -5119,7 +5247,15 @@
             </a:pPr>
             <a:r>
               <a:rPr lang="de-DE" sz="2400" dirty="0" smtClean="0"/>
-              <a:t>unterstützt bei der Entscheidung</a:t>
+              <a:t>unterstützt </a:t>
+            </a:r>
+            <a:r>
+              <a:rPr lang="de-DE" sz="2400" dirty="0" smtClean="0"/>
+              <a:t>bei </a:t>
+            </a:r>
+            <a:r>
+              <a:rPr lang="de-DE" sz="2400" dirty="0" smtClean="0"/>
+              <a:t>Entscheidung</a:t>
             </a:r>
             <a:r>
               <a:rPr lang="en-US" sz="2400" dirty="0" smtClean="0"/>
@@ -6583,23 +6719,7 @@
                   <a:srgbClr val="FFFF00"/>
                 </a:solidFill>
               </a:rPr>
-              <a:t>„Ein </a:t>
-            </a:r>
-            <a:r>
-              <a:rPr lang="de-DE" dirty="0" smtClean="0">
-                <a:solidFill>
-                  <a:srgbClr val="FFFF00"/>
-                </a:solidFill>
-              </a:rPr>
-              <a:t>Commit beschreibt eine Menge von Änderungen an Ressourcen eines Repository</a:t>
-            </a:r>
-            <a:r>
-              <a:rPr lang="de-DE" dirty="0" smtClean="0">
-                <a:solidFill>
-                  <a:srgbClr val="FFFF00"/>
-                </a:solidFill>
-              </a:rPr>
-              <a:t>.“</a:t>
+              <a:t>„Ein Commit beschreibt eine Menge von Änderungen an Ressourcen eines Repository.“</a:t>
             </a:r>
             <a:endParaRPr lang="de-DE" dirty="0">
               <a:solidFill>
@@ -6780,7 +6900,15 @@
             </a:pPr>
             <a:r>
               <a:rPr lang="de-DE" sz="2400" dirty="0" smtClean="0"/>
-              <a:t>Änderungen werden ins VCS eingepflegt</a:t>
+              <a:t>Änderungen werden </a:t>
+            </a:r>
+            <a:r>
+              <a:rPr lang="de-DE" sz="2400" dirty="0" smtClean="0"/>
+              <a:t>lokal ins </a:t>
+            </a:r>
+            <a:r>
+              <a:rPr lang="de-DE" sz="2400" dirty="0" smtClean="0"/>
+              <a:t>VCS eingepflegt</a:t>
             </a:r>
           </a:p>
           <a:p>
@@ -6888,7 +7016,86 @@
             </a:r>
             <a:r>
               <a:rPr lang="de-DE" sz="2000" dirty="0" smtClean="0"/>
-              <a:t>” ist keine gute Message</a:t>
+              <a:t>”, “</a:t>
+            </a:r>
+            <a:r>
+              <a:rPr lang="de-DE" sz="2000" dirty="0" err="1" smtClean="0"/>
+              <a:t>bug</a:t>
+            </a:r>
+            <a:r>
+              <a:rPr lang="de-DE" sz="2000" dirty="0" smtClean="0"/>
+              <a:t> fix“, “</a:t>
+            </a:r>
+            <a:r>
+              <a:rPr lang="de-DE" sz="2000" dirty="0" err="1" smtClean="0"/>
+              <a:t>more</a:t>
+            </a:r>
+            <a:r>
+              <a:rPr lang="de-DE" sz="2000" dirty="0" smtClean="0"/>
+              <a:t> </a:t>
+            </a:r>
+            <a:r>
+              <a:rPr lang="de-DE" sz="2000" dirty="0" err="1" smtClean="0"/>
+              <a:t>work</a:t>
+            </a:r>
+            <a:r>
+              <a:rPr lang="de-DE" sz="2000" dirty="0" smtClean="0"/>
+              <a:t>“, “minor </a:t>
+            </a:r>
+            <a:r>
+              <a:rPr lang="de-DE" sz="2000" dirty="0" err="1" smtClean="0"/>
+              <a:t>changes</a:t>
+            </a:r>
+            <a:r>
+              <a:rPr lang="de-DE" sz="2000" dirty="0" smtClean="0"/>
+              <a:t>“ oder</a:t>
+            </a:r>
+            <a:br>
+              <a:rPr lang="de-DE" sz="2000" dirty="0" smtClean="0"/>
+            </a:br>
+            <a:r>
+              <a:rPr lang="de-DE" sz="2000" dirty="0" smtClean="0"/>
+              <a:t>“</a:t>
+            </a:r>
+            <a:r>
+              <a:rPr lang="de-DE" sz="2000" dirty="0" err="1" smtClean="0"/>
+              <a:t>pls</a:t>
+            </a:r>
+            <a:r>
+              <a:rPr lang="de-DE" sz="2000" dirty="0" smtClean="0"/>
+              <a:t> kill </a:t>
+            </a:r>
+            <a:r>
+              <a:rPr lang="de-DE" sz="2000" dirty="0" err="1" smtClean="0"/>
+              <a:t>me</a:t>
+            </a:r>
+            <a:r>
+              <a:rPr lang="de-DE" sz="2000" dirty="0" smtClean="0"/>
+              <a:t>“ sind </a:t>
+            </a:r>
+            <a:r>
+              <a:rPr lang="de-DE" sz="2000" u="sng" dirty="0" smtClean="0">
+                <a:solidFill>
+                  <a:srgbClr val="FFC000"/>
+                </a:solidFill>
+              </a:rPr>
+              <a:t>keine</a:t>
+            </a:r>
+            <a:r>
+              <a:rPr lang="de-DE" sz="2000" dirty="0" smtClean="0"/>
+              <a:t> </a:t>
+            </a:r>
+            <a:r>
+              <a:rPr lang="de-DE" sz="2000" dirty="0" smtClean="0"/>
+              <a:t>guten </a:t>
+            </a:r>
+            <a:r>
+              <a:rPr lang="de-DE" sz="2000" dirty="0" err="1" smtClean="0"/>
+              <a:t>messages</a:t>
+            </a:r>
+            <a:r>
+              <a:rPr lang="de-DE" sz="2000" dirty="0" smtClean="0"/>
+              <a:t>…</a:t>
             </a:r>
             <a:endParaRPr lang="de-DE" sz="2000" dirty="0"/>
           </a:p>
@@ -7199,15 +7406,7 @@
             </a:r>
             <a:r>
               <a:rPr lang="de-DE" sz="2400" dirty="0" smtClean="0"/>
-              <a:t> </a:t>
-            </a:r>
-            <a:r>
-              <a:rPr lang="de-DE" sz="2400" dirty="0" smtClean="0"/>
-              <a:t>– Was und wieso</a:t>
-            </a:r>
-            <a:r>
-              <a:rPr lang="de-DE" sz="2400" dirty="0" smtClean="0"/>
-              <a:t>?</a:t>
+              <a:t> – Was und wieso?</a:t>
             </a:r>
           </a:p>
           <a:p>
@@ -7262,11 +7461,7 @@
             </a:r>
             <a:r>
               <a:rPr lang="de-DE" sz="2400" dirty="0" smtClean="0"/>
-              <a:t> </a:t>
-            </a:r>
-            <a:r>
-              <a:rPr lang="de-DE" sz="2400" dirty="0" smtClean="0"/>
-              <a:t>im Praktikum</a:t>
+              <a:t> im Praktikum</a:t>
             </a:r>
           </a:p>
         </p:txBody>
@@ -7613,7 +7808,15 @@
                   <a:srgbClr val="FFFF00"/>
                 </a:solidFill>
               </a:rPr>
-              <a:t>wird das ganze nun </a:t>
+              <a:t>wird das </a:t>
+            </a:r>
+            <a:r>
+              <a:rPr lang="de-DE" sz="2400" dirty="0" smtClean="0">
+                <a:solidFill>
+                  <a:srgbClr val="FFFF00"/>
+                </a:solidFill>
+              </a:rPr>
+              <a:t>Ganze </a:t>
             </a:r>
             <a:r>
               <a:rPr lang="de-DE" sz="2400" dirty="0" err="1" smtClean="0">
@@ -7642,12 +7845,20 @@
               <a:t>Wie publiziert man </a:t>
             </a:r>
             <a:r>
+              <a:rPr lang="de-DE" sz="2400" dirty="0" smtClean="0">
+                <a:solidFill>
+                  <a:srgbClr val="FFFF00"/>
+                </a:solidFill>
+              </a:rPr>
+              <a:t>seine </a:t>
+            </a:r>
+            <a:r>
               <a:rPr lang="de-DE" sz="2400" dirty="0">
                 <a:solidFill>
                   <a:srgbClr val="FFFF00"/>
                 </a:solidFill>
               </a:rPr>
-              <a:t>nun seine Änderungen</a:t>
+              <a:t>Änderungen</a:t>
             </a:r>
             <a:r>
               <a:rPr lang="en-US" sz="2400" dirty="0" smtClean="0">
@@ -7753,6 +7964,13 @@
   <p:clrMapOvr>
     <a:masterClrMapping/>
   </p:clrMapOvr>
+  <p:timing>
+    <p:tnLst>
+      <p:par>
+        <p:cTn id="1" dur="indefinite" restart="never" nodeType="tmRoot"/>
+      </p:par>
+    </p:tnLst>
+  </p:timing>
 </p:sld>
 </file>
 
@@ -7807,25 +8025,6 @@
       </p:sp>
       <p:sp>
         <p:nvSpPr>
-          <p:cNvPr id="3" name="Inhaltsplatzhalter 2"/>
-          <p:cNvSpPr>
-            <a:spLocks noGrp="1"/>
-          </p:cNvSpPr>
-          <p:nvPr>
-            <p:ph idx="1"/>
-          </p:nvPr>
-        </p:nvSpPr>
-        <p:spPr/>
-        <p:txBody>
-          <a:bodyPr/>
-          <a:lstStyle/>
-          <a:p>
-            <a:endParaRPr lang="de-DE"/>
-          </a:p>
-        </p:txBody>
-      </p:sp>
-      <p:sp>
-        <p:nvSpPr>
           <p:cNvPr id="4" name="Fußzeilenplatzhalter 3"/>
           <p:cNvSpPr>
             <a:spLocks noGrp="1"/>
@@ -7847,6 +8046,285 @@
           </a:p>
         </p:txBody>
       </p:sp>
+      <p:sp>
+        <p:nvSpPr>
+          <p:cNvPr id="7" name="Inhaltsplatzhalter 6"/>
+          <p:cNvSpPr>
+            <a:spLocks noGrp="1"/>
+          </p:cNvSpPr>
+          <p:nvPr>
+            <p:ph idx="1"/>
+          </p:nvPr>
+        </p:nvSpPr>
+        <p:spPr>
+          <a:xfrm>
+            <a:off x="457200" y="1194141"/>
+            <a:ext cx="8229600" cy="3394472"/>
+          </a:xfrm>
+        </p:spPr>
+        <p:txBody>
+          <a:bodyPr/>
+          <a:lstStyle/>
+          <a:p>
+            <a:endParaRPr lang="en-US" dirty="0" smtClean="0"/>
+          </a:p>
+          <a:p>
+            <a:pPr marL="342900" indent="-342900">
+              <a:buClr>
+                <a:srgbClr val="FFFF00"/>
+              </a:buClr>
+              <a:buFont typeface="Arial" panose="020B0604020202020204" pitchFamily="34" charset="0"/>
+              <a:buChar char="•"/>
+            </a:pPr>
+            <a:r>
+              <a:rPr lang="de-DE" sz="2400" dirty="0" smtClean="0"/>
+              <a:t>verknüpft </a:t>
+            </a:r>
+            <a:r>
+              <a:rPr lang="de-DE" sz="2400" dirty="0" err="1" smtClean="0"/>
+              <a:t>local</a:t>
+            </a:r>
+            <a:r>
+              <a:rPr lang="de-DE" sz="2400" dirty="0" smtClean="0"/>
+              <a:t> </a:t>
+            </a:r>
+            <a:r>
+              <a:rPr lang="de-DE" sz="2400" dirty="0" err="1" smtClean="0"/>
+              <a:t>repository</a:t>
+            </a:r>
+            <a:r>
+              <a:rPr lang="de-DE" sz="2400" dirty="0" smtClean="0"/>
+              <a:t> mit einem remote </a:t>
+            </a:r>
+            <a:r>
+              <a:rPr lang="de-DE" sz="2400" dirty="0" err="1" smtClean="0"/>
+              <a:t>repository</a:t>
+            </a:r>
+            <a:endParaRPr lang="de-DE" sz="2400" dirty="0" smtClean="0"/>
+          </a:p>
+          <a:p>
+            <a:pPr marL="342900" indent="-342900">
+              <a:buClr>
+                <a:srgbClr val="FFFF00"/>
+              </a:buClr>
+              <a:buFont typeface="Arial" panose="020B0604020202020204" pitchFamily="34" charset="0"/>
+              <a:buChar char="•"/>
+            </a:pPr>
+            <a:r>
+              <a:rPr lang="de-DE" sz="2400" dirty="0" smtClean="0">
+                <a:solidFill>
+                  <a:srgbClr val="81D4FA"/>
+                </a:solidFill>
+              </a:rPr>
+              <a:t>&lt;alias&gt;</a:t>
+            </a:r>
+            <a:r>
+              <a:rPr lang="de-DE" sz="2400" dirty="0" smtClean="0"/>
+              <a:t>: Alias, unter dem der remote </a:t>
+            </a:r>
+            <a:r>
+              <a:rPr lang="de-DE" sz="2400" dirty="0" smtClean="0">
+                <a:solidFill>
+                  <a:srgbClr val="81D4FA"/>
+                </a:solidFill>
+              </a:rPr>
+              <a:t>lokal bekannt ist</a:t>
+            </a:r>
+          </a:p>
+          <a:p>
+            <a:pPr marL="342900" indent="-342900">
+              <a:buClr>
+                <a:srgbClr val="FFFF00"/>
+              </a:buClr>
+              <a:buFont typeface="Arial" panose="020B0604020202020204" pitchFamily="34" charset="0"/>
+              <a:buChar char="•"/>
+            </a:pPr>
+            <a:r>
+              <a:rPr lang="de-DE" sz="2400" dirty="0" smtClean="0">
+                <a:solidFill>
+                  <a:srgbClr val="81D4FA"/>
+                </a:solidFill>
+              </a:rPr>
+              <a:t>&lt;</a:t>
+            </a:r>
+            <a:r>
+              <a:rPr lang="de-DE" sz="2400" dirty="0" err="1" smtClean="0">
+                <a:solidFill>
+                  <a:srgbClr val="81D4FA"/>
+                </a:solidFill>
+              </a:rPr>
+              <a:t>url</a:t>
+            </a:r>
+            <a:r>
+              <a:rPr lang="de-DE" sz="2400" dirty="0" smtClean="0">
+                <a:solidFill>
+                  <a:srgbClr val="81D4FA"/>
+                </a:solidFill>
+              </a:rPr>
+              <a:t>&gt;</a:t>
+            </a:r>
+            <a:r>
+              <a:rPr lang="de-DE" sz="2400" dirty="0" smtClean="0"/>
+              <a:t>: URL des remote </a:t>
+            </a:r>
+            <a:r>
+              <a:rPr lang="de-DE" sz="2400" dirty="0" err="1" smtClean="0"/>
+              <a:t>repository</a:t>
+            </a:r>
+            <a:endParaRPr lang="de-DE" sz="2400" dirty="0" smtClean="0"/>
+          </a:p>
+          <a:p>
+            <a:pPr marL="342900" indent="-342900">
+              <a:buClr>
+                <a:srgbClr val="FFFF00"/>
+              </a:buClr>
+              <a:buFont typeface="Arial" panose="020B0604020202020204" pitchFamily="34" charset="0"/>
+              <a:buChar char="•"/>
+            </a:pPr>
+            <a:endParaRPr lang="en-US" sz="2400" dirty="0"/>
+          </a:p>
+          <a:p>
+            <a:pPr marL="342900" indent="-342900">
+              <a:buClr>
+                <a:srgbClr val="FFFF00"/>
+              </a:buClr>
+              <a:buFont typeface="Arial" panose="020B0604020202020204" pitchFamily="34" charset="0"/>
+              <a:buChar char="•"/>
+            </a:pPr>
+            <a:endParaRPr lang="en-US" sz="2400" dirty="0" smtClean="0"/>
+          </a:p>
+          <a:p>
+            <a:pPr marL="342900" indent="-342900">
+              <a:buClr>
+                <a:srgbClr val="FFFF00"/>
+              </a:buClr>
+              <a:buFont typeface="Arial" panose="020B0604020202020204" pitchFamily="34" charset="0"/>
+              <a:buChar char="•"/>
+            </a:pPr>
+            <a:r>
+              <a:rPr lang="de-DE" sz="2400" dirty="0" smtClean="0"/>
+              <a:t>zeigt alle verfügbaren remote </a:t>
+            </a:r>
+            <a:r>
+              <a:rPr lang="de-DE" sz="2400" dirty="0" err="1" smtClean="0"/>
+              <a:t>repositories</a:t>
+            </a:r>
+            <a:r>
+              <a:rPr lang="de-DE" sz="2400" dirty="0" smtClean="0"/>
+              <a:t> an</a:t>
+            </a:r>
+            <a:endParaRPr lang="de-DE" sz="2400" dirty="0"/>
+          </a:p>
+        </p:txBody>
+      </p:sp>
+      <p:pic>
+        <p:nvPicPr>
+          <p:cNvPr id="10" name="Picture 2"/>
+          <p:cNvPicPr>
+            <a:picLocks noChangeAspect="1" noChangeArrowheads="1"/>
+          </p:cNvPicPr>
+          <p:nvPr/>
+        </p:nvPicPr>
+        <p:blipFill>
+          <a:blip r:embed="rId2">
+            <a:extLst>
+              <a:ext uri="{28A0092B-C50C-407E-A947-70E740481C1C}">
+                <a14:useLocalDpi xmlns:a14="http://schemas.microsoft.com/office/drawing/2010/main" val="0"/>
+              </a:ext>
+            </a:extLst>
+          </a:blip>
+          <a:srcRect/>
+          <a:stretch>
+            <a:fillRect/>
+          </a:stretch>
+        </p:blipFill>
+        <p:spPr bwMode="auto">
+          <a:xfrm>
+            <a:off x="457200" y="1194141"/>
+            <a:ext cx="3657341" cy="487021"/>
+          </a:xfrm>
+          <a:prstGeom prst="rect">
+            <a:avLst/>
+          </a:prstGeom>
+          <a:noFill/>
+          <a:ln>
+            <a:noFill/>
+          </a:ln>
+          <a:extLst>
+            <a:ext uri="{909E8E84-426E-40DD-AFC4-6F175D3DCCD1}">
+              <a14:hiddenFill xmlns:a14="http://schemas.microsoft.com/office/drawing/2010/main">
+                <a:solidFill>
+                  <a:schemeClr val="accent1"/>
+                </a:solidFill>
+              </a14:hiddenFill>
+            </a:ext>
+            <a:ext uri="{91240B29-F687-4F45-9708-019B960494DF}">
+              <a14:hiddenLine xmlns:a14="http://schemas.microsoft.com/office/drawing/2010/main" w="9525">
+                <a:solidFill>
+                  <a:schemeClr val="tx1"/>
+                </a:solidFill>
+                <a:miter lim="800000"/>
+                <a:headEnd/>
+                <a:tailEnd/>
+              </a14:hiddenLine>
+            </a:ext>
+          </a:extLst>
+        </p:spPr>
+      </p:pic>
+      <p:pic>
+        <p:nvPicPr>
+          <p:cNvPr id="2050" name="Picture 2"/>
+          <p:cNvPicPr>
+            <a:picLocks noChangeAspect="1" noChangeArrowheads="1"/>
+          </p:cNvPicPr>
+          <p:nvPr/>
+        </p:nvPicPr>
+        <p:blipFill>
+          <a:blip r:embed="rId3">
+            <a:extLst>
+              <a:ext uri="{28A0092B-C50C-407E-A947-70E740481C1C}">
+                <a14:useLocalDpi xmlns:a14="http://schemas.microsoft.com/office/drawing/2010/main" val="0"/>
+              </a:ext>
+            </a:extLst>
+          </a:blip>
+          <a:srcRect/>
+          <a:stretch>
+            <a:fillRect/>
+          </a:stretch>
+        </p:blipFill>
+        <p:spPr bwMode="auto">
+          <a:xfrm>
+            <a:off x="457200" y="3486150"/>
+            <a:ext cx="1857374" cy="485775"/>
+          </a:xfrm>
+          <a:prstGeom prst="rect">
+            <a:avLst/>
+          </a:prstGeom>
+          <a:noFill/>
+          <a:ln>
+            <a:noFill/>
+          </a:ln>
+          <a:extLst>
+            <a:ext uri="{909E8E84-426E-40DD-AFC4-6F175D3DCCD1}">
+              <a14:hiddenFill xmlns:a14="http://schemas.microsoft.com/office/drawing/2010/main">
+                <a:solidFill>
+                  <a:schemeClr val="accent1"/>
+                </a:solidFill>
+              </a14:hiddenFill>
+            </a:ext>
+            <a:ext uri="{91240B29-F687-4F45-9708-019B960494DF}">
+              <a14:hiddenLine xmlns:a14="http://schemas.microsoft.com/office/drawing/2010/main" w="9525">
+                <a:solidFill>
+                  <a:schemeClr val="tx1"/>
+                </a:solidFill>
+                <a:miter lim="800000"/>
+                <a:headEnd/>
+                <a:tailEnd/>
+              </a14:hiddenLine>
+            </a:ext>
+          </a:extLst>
+        </p:spPr>
+      </p:pic>
     </p:spTree>
     <p:extLst>
       <p:ext uri="{BB962C8B-B14F-4D97-AF65-F5344CB8AC3E}">
@@ -7857,6 +8335,13 @@
   <p:clrMapOvr>
     <a:masterClrMapping/>
   </p:clrMapOvr>
+  <p:timing>
+    <p:tnLst>
+      <p:par>
+        <p:cTn id="1" dur="indefinite" restart="never" nodeType="tmRoot"/>
+      </p:par>
+    </p:tnLst>
+  </p:timing>
 </p:sld>
 </file>
 
@@ -7879,6 +8364,356 @@
       </p:grpSpPr>
       <p:sp>
         <p:nvSpPr>
+          <p:cNvPr id="4" name="Fußzeilenplatzhalter 3"/>
+          <p:cNvSpPr>
+            <a:spLocks noGrp="1"/>
+          </p:cNvSpPr>
+          <p:nvPr>
+            <p:ph type="ftr" sz="quarter" idx="11"/>
+          </p:nvPr>
+        </p:nvSpPr>
+        <p:spPr/>
+        <p:txBody>
+          <a:bodyPr/>
+          <a:lstStyle/>
+          <a:p>
+            <a:r>
+              <a:rPr lang="en-US" smtClean="0"/>
+              <a:t>TU Dresden – Robolab 2018</a:t>
+            </a:r>
+            <a:endParaRPr lang="en-US" dirty="0"/>
+          </a:p>
+        </p:txBody>
+      </p:sp>
+      <p:pic>
+        <p:nvPicPr>
+          <p:cNvPr id="6" name="Picture 2"/>
+          <p:cNvPicPr>
+            <a:picLocks noChangeAspect="1" noChangeArrowheads="1"/>
+          </p:cNvPicPr>
+          <p:nvPr/>
+        </p:nvPicPr>
+        <p:blipFill>
+          <a:blip r:embed="rId2">
+            <a:extLst>
+              <a:ext uri="{28A0092B-C50C-407E-A947-70E740481C1C}">
+                <a14:useLocalDpi xmlns:a14="http://schemas.microsoft.com/office/drawing/2010/main" val="0"/>
+              </a:ext>
+            </a:extLst>
+          </a:blip>
+          <a:srcRect/>
+          <a:stretch>
+            <a:fillRect/>
+          </a:stretch>
+        </p:blipFill>
+        <p:spPr bwMode="auto">
+          <a:xfrm>
+            <a:off x="304800" y="612359"/>
+            <a:ext cx="6781800" cy="1980758"/>
+          </a:xfrm>
+          <a:prstGeom prst="rect">
+            <a:avLst/>
+          </a:prstGeom>
+          <a:noFill/>
+          <a:ln>
+            <a:noFill/>
+          </a:ln>
+          <a:extLst>
+            <a:ext uri="{909E8E84-426E-40DD-AFC4-6F175D3DCCD1}">
+              <a14:hiddenFill xmlns:a14="http://schemas.microsoft.com/office/drawing/2010/main">
+                <a:solidFill>
+                  <a:schemeClr val="accent1"/>
+                </a:solidFill>
+              </a14:hiddenFill>
+            </a:ext>
+            <a:ext uri="{91240B29-F687-4F45-9708-019B960494DF}">
+              <a14:hiddenLine xmlns:a14="http://schemas.microsoft.com/office/drawing/2010/main" w="9525">
+                <a:solidFill>
+                  <a:schemeClr val="tx1"/>
+                </a:solidFill>
+                <a:miter lim="800000"/>
+                <a:headEnd/>
+                <a:tailEnd/>
+              </a14:hiddenLine>
+            </a:ext>
+          </a:extLst>
+        </p:spPr>
+      </p:pic>
+      <p:cxnSp>
+        <p:nvCxnSpPr>
+          <p:cNvPr id="7" name="Gekrümmte Verbindung 6"/>
+          <p:cNvCxnSpPr/>
+          <p:nvPr/>
+        </p:nvCxnSpPr>
+        <p:spPr>
+          <a:xfrm rot="16200000" flipH="1">
+            <a:off x="569268" y="2535882"/>
+            <a:ext cx="1223664" cy="1143000"/>
+          </a:xfrm>
+          <a:prstGeom prst="curvedConnector3">
+            <a:avLst>
+              <a:gd name="adj1" fmla="val 50000"/>
+            </a:avLst>
+          </a:prstGeom>
+          <a:ln w="38100">
+            <a:solidFill>
+              <a:schemeClr val="bg1"/>
+            </a:solidFill>
+            <a:prstDash val="dash"/>
+            <a:tailEnd type="triangle" w="lg" len="med"/>
+          </a:ln>
+        </p:spPr>
+        <p:style>
+          <a:lnRef idx="1">
+            <a:schemeClr val="accent1"/>
+          </a:lnRef>
+          <a:fillRef idx="0">
+            <a:schemeClr val="accent1"/>
+          </a:fillRef>
+          <a:effectRef idx="0">
+            <a:schemeClr val="accent1"/>
+          </a:effectRef>
+          <a:fontRef idx="minor">
+            <a:schemeClr val="tx1"/>
+          </a:fontRef>
+        </p:style>
+      </p:cxnSp>
+      <p:sp>
+        <p:nvSpPr>
+          <p:cNvPr id="8" name="Textfeld 7"/>
+          <p:cNvSpPr txBox="1"/>
+          <p:nvPr/>
+        </p:nvSpPr>
+        <p:spPr>
+          <a:xfrm>
+            <a:off x="914400" y="3719214"/>
+            <a:ext cx="2036344" cy="646331"/>
+          </a:xfrm>
+          <a:prstGeom prst="rect">
+            <a:avLst/>
+          </a:prstGeom>
+          <a:noFill/>
+        </p:spPr>
+        <p:txBody>
+          <a:bodyPr wrap="square" rtlCol="0">
+            <a:spAutoFit/>
+          </a:bodyPr>
+          <a:lstStyle/>
+          <a:p>
+            <a:pPr algn="ctr"/>
+            <a:r>
+              <a:rPr lang="de-DE" dirty="0" smtClean="0">
+                <a:solidFill>
+                  <a:schemeClr val="bg1"/>
+                </a:solidFill>
+                <a:latin typeface="Bahnschrift Light" panose="020B0502040204020203" pitchFamily="34" charset="0"/>
+              </a:rPr>
+              <a:t>alias </a:t>
+            </a:r>
+            <a:r>
+              <a:rPr lang="de-DE" dirty="0" err="1" smtClean="0">
+                <a:solidFill>
+                  <a:srgbClr val="81D4FA"/>
+                </a:solidFill>
+                <a:latin typeface="Bahnschrift Light" panose="020B0502040204020203" pitchFamily="34" charset="0"/>
+              </a:rPr>
+              <a:t>origin</a:t>
+            </a:r>
+            <a:r>
+              <a:rPr lang="de-DE" dirty="0" smtClean="0">
+                <a:solidFill>
+                  <a:schemeClr val="bg1"/>
+                </a:solidFill>
+                <a:latin typeface="Bahnschrift Light" panose="020B0502040204020203" pitchFamily="34" charset="0"/>
+              </a:rPr>
+              <a:t> für die lange URL</a:t>
+            </a:r>
+            <a:endParaRPr lang="de-DE" dirty="0" smtClean="0">
+              <a:solidFill>
+                <a:schemeClr val="bg1"/>
+              </a:solidFill>
+              <a:latin typeface="Bahnschrift Light" panose="020B0502040204020203" pitchFamily="34" charset="0"/>
+            </a:endParaRPr>
+          </a:p>
+        </p:txBody>
+      </p:sp>
+      <p:cxnSp>
+        <p:nvCxnSpPr>
+          <p:cNvPr id="10" name="Gekrümmte Verbindung 9"/>
+          <p:cNvCxnSpPr>
+            <a:endCxn id="11" idx="0"/>
+          </p:cNvCxnSpPr>
+          <p:nvPr/>
+        </p:nvCxnSpPr>
+        <p:spPr>
+          <a:xfrm rot="16200000" flipH="1">
+            <a:off x="5780399" y="2602068"/>
+            <a:ext cx="811174" cy="789572"/>
+          </a:xfrm>
+          <a:prstGeom prst="curvedConnector3">
+            <a:avLst>
+              <a:gd name="adj1" fmla="val 50000"/>
+            </a:avLst>
+          </a:prstGeom>
+          <a:ln w="38100">
+            <a:solidFill>
+              <a:schemeClr val="bg1"/>
+            </a:solidFill>
+            <a:prstDash val="dash"/>
+            <a:tailEnd type="triangle" w="lg" len="med"/>
+          </a:ln>
+        </p:spPr>
+        <p:style>
+          <a:lnRef idx="1">
+            <a:schemeClr val="accent1"/>
+          </a:lnRef>
+          <a:fillRef idx="0">
+            <a:schemeClr val="accent1"/>
+          </a:fillRef>
+          <a:effectRef idx="0">
+            <a:schemeClr val="accent1"/>
+          </a:effectRef>
+          <a:fontRef idx="minor">
+            <a:schemeClr val="tx1"/>
+          </a:fontRef>
+        </p:style>
+      </p:cxnSp>
+      <p:sp>
+        <p:nvSpPr>
+          <p:cNvPr id="11" name="Textfeld 10"/>
+          <p:cNvSpPr txBox="1"/>
+          <p:nvPr/>
+        </p:nvSpPr>
+        <p:spPr>
+          <a:xfrm>
+            <a:off x="5562600" y="3402441"/>
+            <a:ext cx="2036344" cy="923330"/>
+          </a:xfrm>
+          <a:prstGeom prst="rect">
+            <a:avLst/>
+          </a:prstGeom>
+          <a:noFill/>
+        </p:spPr>
+        <p:txBody>
+          <a:bodyPr wrap="square" rtlCol="0">
+            <a:spAutoFit/>
+          </a:bodyPr>
+          <a:lstStyle/>
+          <a:p>
+            <a:pPr algn="ctr"/>
+            <a:r>
+              <a:rPr lang="en-US" dirty="0" smtClean="0">
+                <a:solidFill>
+                  <a:srgbClr val="81D4FA"/>
+                </a:solidFill>
+                <a:latin typeface="Bahnschrift Light" panose="020B0502040204020203" pitchFamily="34" charset="0"/>
+              </a:rPr>
+              <a:t>fetch</a:t>
+            </a:r>
+            <a:r>
+              <a:rPr lang="en-US" dirty="0" smtClean="0">
+                <a:solidFill>
+                  <a:schemeClr val="bg1"/>
+                </a:solidFill>
+                <a:latin typeface="Bahnschrift Light" panose="020B0502040204020203" pitchFamily="34" charset="0"/>
+              </a:rPr>
+              <a:t> und </a:t>
+            </a:r>
+            <a:r>
+              <a:rPr lang="en-US" dirty="0" smtClean="0">
+                <a:solidFill>
+                  <a:srgbClr val="81D4FA"/>
+                </a:solidFill>
+                <a:latin typeface="Bahnschrift Light" panose="020B0502040204020203" pitchFamily="34" charset="0"/>
+              </a:rPr>
+              <a:t>push</a:t>
+            </a:r>
+            <a:r>
+              <a:rPr lang="en-US" dirty="0" smtClean="0">
+                <a:solidFill>
+                  <a:schemeClr val="bg1"/>
+                </a:solidFill>
+                <a:latin typeface="Bahnschrift Light" panose="020B0502040204020203" pitchFamily="34" charset="0"/>
+              </a:rPr>
+              <a:t> </a:t>
+            </a:r>
+            <a:r>
+              <a:rPr lang="en-US" dirty="0" err="1" smtClean="0">
+                <a:solidFill>
+                  <a:schemeClr val="bg1"/>
+                </a:solidFill>
+                <a:latin typeface="Bahnschrift Light" panose="020B0502040204020203" pitchFamily="34" charset="0"/>
+              </a:rPr>
+              <a:t>für</a:t>
+            </a:r>
+            <a:r>
+              <a:rPr lang="en-US" dirty="0" smtClean="0">
+                <a:solidFill>
+                  <a:schemeClr val="bg1"/>
+                </a:solidFill>
+                <a:latin typeface="Bahnschrift Light" panose="020B0502040204020203" pitchFamily="34" charset="0"/>
+              </a:rPr>
+              <a:t> read und write </a:t>
+            </a:r>
+            <a:r>
+              <a:rPr lang="en-US" dirty="0" err="1" smtClean="0">
+                <a:solidFill>
+                  <a:schemeClr val="bg1"/>
+                </a:solidFill>
+                <a:latin typeface="Bahnschrift Light" panose="020B0502040204020203" pitchFamily="34" charset="0"/>
+              </a:rPr>
+              <a:t>vom</a:t>
+            </a:r>
+            <a:r>
+              <a:rPr lang="en-US" dirty="0" smtClean="0">
+                <a:solidFill>
+                  <a:schemeClr val="bg1"/>
+                </a:solidFill>
+                <a:latin typeface="Bahnschrift Light" panose="020B0502040204020203" pitchFamily="34" charset="0"/>
+              </a:rPr>
+              <a:t>/auf remote</a:t>
+            </a:r>
+            <a:endParaRPr lang="de-DE" dirty="0" smtClean="0">
+              <a:solidFill>
+                <a:schemeClr val="bg1"/>
+              </a:solidFill>
+              <a:latin typeface="Bahnschrift Light" panose="020B0502040204020203" pitchFamily="34" charset="0"/>
+            </a:endParaRPr>
+          </a:p>
+        </p:txBody>
+      </p:sp>
+    </p:spTree>
+    <p:extLst>
+      <p:ext uri="{BB962C8B-B14F-4D97-AF65-F5344CB8AC3E}">
+        <p14:creationId xmlns:p14="http://schemas.microsoft.com/office/powerpoint/2010/main" val="2541238121"/>
+      </p:ext>
+    </p:extLst>
+  </p:cSld>
+  <p:clrMapOvr>
+    <a:masterClrMapping/>
+  </p:clrMapOvr>
+</p:sld>
+</file>
+
+<file path=ppt/slides/slide24.xml><?xml version="1.0" encoding="utf-8"?>
+<p:sld xmlns:a="http://schemas.openxmlformats.org/drawingml/2006/main" xmlns:r="http://schemas.openxmlformats.org/officeDocument/2006/relationships" xmlns:p="http://schemas.openxmlformats.org/presentationml/2006/main">
+  <p:cSld>
+    <p:spTree>
+      <p:nvGrpSpPr>
+        <p:cNvPr id="1" name=""/>
+        <p:cNvGrpSpPr/>
+        <p:nvPr/>
+      </p:nvGrpSpPr>
+      <p:grpSpPr>
+        <a:xfrm>
+          <a:off x="0" y="0"/>
+          <a:ext cx="0" cy="0"/>
+          <a:chOff x="0" y="0"/>
+          <a:chExt cx="0" cy="0"/>
+        </a:xfrm>
+      </p:grpSpPr>
+      <p:sp>
+        <p:nvSpPr>
           <p:cNvPr id="2" name="Titel 1"/>
           <p:cNvSpPr>
             <a:spLocks noGrp="1"/>
@@ -8073,8 +8908,13 @@
             </a:r>
             <a:r>
               <a:rPr lang="en-US" sz="2400" dirty="0" smtClean="0"/>
-              <a:t> remote </a:t>
-            </a:r>
+              <a:t> </a:t>
+            </a:r>
+            <a:r>
+              <a:rPr lang="en-US" sz="2400" dirty="0" smtClean="0"/>
+              <a:t>remote repository </a:t>
+            </a:r>
+            <a:endParaRPr lang="en-US" sz="2400" dirty="0" smtClean="0"/>
           </a:p>
           <a:p>
             <a:pPr marL="457200" indent="-457200">
@@ -8106,19 +8946,15 @@
             </a:r>
             <a:r>
               <a:rPr lang="en-US" sz="2400" dirty="0" err="1" smtClean="0"/>
-              <a:t>nicht</a:t>
+              <a:t>volle</a:t>
             </a:r>
             <a:r>
               <a:rPr lang="en-US" sz="2400" dirty="0" smtClean="0"/>
-              <a:t> die </a:t>
-            </a:r>
-            <a:r>
-              <a:rPr lang="en-US" sz="2400" dirty="0" err="1" smtClean="0"/>
-              <a:t>volle</a:t>
+              <a:t> </a:t>
             </a:r>
             <a:r>
               <a:rPr lang="en-US" sz="2400" dirty="0" smtClean="0"/>
-              <a:t> URL </a:t>
+              <a:t>URL </a:t>
             </a:r>
             <a:r>
               <a:rPr lang="en-US" sz="2400" dirty="0" err="1" smtClean="0"/>
@@ -8130,7 +8966,7 @@
             </a:r>
             <a:r>
               <a:rPr lang="en-US" sz="2400" dirty="0" err="1" smtClean="0"/>
-              <a:t>angegeben</a:t>
+              <a:t>nicht</a:t>
             </a:r>
             <a:r>
               <a:rPr lang="en-US" sz="2400" dirty="0" smtClean="0"/>
@@ -8138,11 +8974,23 @@
             </a:r>
             <a:r>
               <a:rPr lang="en-US" sz="2400" dirty="0" err="1" smtClean="0"/>
+              <a:t>angegeben</a:t>
+            </a:r>
+            <a:r>
+              <a:rPr lang="en-US" sz="2400" dirty="0" smtClean="0"/>
+              <a:t> </a:t>
+            </a:r>
+            <a:r>
+              <a:rPr lang="en-US" sz="2400" dirty="0" err="1" smtClean="0"/>
               <a:t>werden</a:t>
             </a:r>
             <a:r>
               <a:rPr lang="en-US" sz="2400" dirty="0" smtClean="0"/>
-              <a:t> muss</a:t>
+              <a:t> </a:t>
+            </a:r>
+            <a:r>
+              <a:rPr lang="en-US" sz="2400" dirty="0" smtClean="0"/>
+              <a:t>muss</a:t>
             </a:r>
           </a:p>
         </p:txBody>
@@ -8211,10 +9059,108 @@
   <p:clrMapOvr>
     <a:masterClrMapping/>
   </p:clrMapOvr>
+  <p:timing>
+    <p:tnLst>
+      <p:par>
+        <p:cTn id="1" dur="indefinite" restart="never" nodeType="tmRoot"/>
+      </p:par>
+    </p:tnLst>
+  </p:timing>
 </p:sld>
 </file>
 
-<file path=ppt/slides/slide24.xml><?xml version="1.0" encoding="utf-8"?>
+<file path=ppt/slides/slide25.xml><?xml version="1.0" encoding="utf-8"?>
+<p:sld xmlns:a="http://schemas.openxmlformats.org/drawingml/2006/main" xmlns:r="http://schemas.openxmlformats.org/officeDocument/2006/relationships" xmlns:p="http://schemas.openxmlformats.org/presentationml/2006/main">
+  <p:cSld>
+    <p:spTree>
+      <p:nvGrpSpPr>
+        <p:cNvPr id="1" name=""/>
+        <p:cNvGrpSpPr/>
+        <p:nvPr/>
+      </p:nvGrpSpPr>
+      <p:grpSpPr>
+        <a:xfrm>
+          <a:off x="0" y="0"/>
+          <a:ext cx="0" cy="0"/>
+          <a:chOff x="0" y="0"/>
+          <a:chExt cx="0" cy="0"/>
+        </a:xfrm>
+      </p:grpSpPr>
+      <p:sp>
+        <p:nvSpPr>
+          <p:cNvPr id="2" name="Titel 1"/>
+          <p:cNvSpPr>
+            <a:spLocks noGrp="1"/>
+          </p:cNvSpPr>
+          <p:nvPr>
+            <p:ph type="title"/>
+          </p:nvPr>
+        </p:nvSpPr>
+        <p:spPr/>
+        <p:txBody>
+          <a:bodyPr/>
+          <a:lstStyle/>
+          <a:p>
+            <a:endParaRPr lang="de-DE"/>
+          </a:p>
+        </p:txBody>
+      </p:sp>
+      <p:sp>
+        <p:nvSpPr>
+          <p:cNvPr id="3" name="Inhaltsplatzhalter 2"/>
+          <p:cNvSpPr>
+            <a:spLocks noGrp="1"/>
+          </p:cNvSpPr>
+          <p:nvPr>
+            <p:ph idx="1"/>
+          </p:nvPr>
+        </p:nvSpPr>
+        <p:spPr/>
+        <p:txBody>
+          <a:bodyPr/>
+          <a:lstStyle/>
+          <a:p>
+            <a:endParaRPr lang="de-DE"/>
+          </a:p>
+        </p:txBody>
+      </p:sp>
+      <p:sp>
+        <p:nvSpPr>
+          <p:cNvPr id="4" name="Fußzeilenplatzhalter 3"/>
+          <p:cNvSpPr>
+            <a:spLocks noGrp="1"/>
+          </p:cNvSpPr>
+          <p:nvPr>
+            <p:ph type="ftr" sz="quarter" idx="11"/>
+          </p:nvPr>
+        </p:nvSpPr>
+        <p:spPr/>
+        <p:txBody>
+          <a:bodyPr/>
+          <a:lstStyle/>
+          <a:p>
+            <a:r>
+              <a:rPr lang="en-US" smtClean="0"/>
+              <a:t>TU Dresden – Robolab 2018</a:t>
+            </a:r>
+            <a:endParaRPr lang="en-US" dirty="0"/>
+          </a:p>
+        </p:txBody>
+      </p:sp>
+    </p:spTree>
+    <p:extLst>
+      <p:ext uri="{BB962C8B-B14F-4D97-AF65-F5344CB8AC3E}">
+        <p14:creationId xmlns:p14="http://schemas.microsoft.com/office/powerpoint/2010/main" val="2919100349"/>
+      </p:ext>
+    </p:extLst>
+  </p:cSld>
+  <p:clrMapOvr>
+    <a:masterClrMapping/>
+  </p:clrMapOvr>
+</p:sld>
+</file>
+
+<file path=ppt/slides/slide26.xml><?xml version="1.0" encoding="utf-8"?>
 <p:sld xmlns:a="http://schemas.openxmlformats.org/drawingml/2006/main" xmlns:r="http://schemas.openxmlformats.org/officeDocument/2006/relationships" xmlns:p="http://schemas.openxmlformats.org/presentationml/2006/main">
   <p:cSld>
     <p:spTree>
@@ -8936,7 +9882,6 @@
               <a:rPr lang="de-DE" sz="2400" dirty="0" smtClean="0"/>
               <a:t> im Team?</a:t>
             </a:r>
-            <a:endParaRPr lang="de-DE" sz="2400" dirty="0" smtClean="0"/>
           </a:p>
           <a:p>
             <a:pPr marL="457200" indent="-457200">
@@ -8970,7 +9915,6 @@
               <a:rPr lang="de-DE" sz="2400" dirty="0" smtClean="0"/>
               <a:t>?</a:t>
             </a:r>
-            <a:endParaRPr lang="de-DE" sz="2400" dirty="0" smtClean="0"/>
           </a:p>
           <a:p>
             <a:pPr marL="457200" indent="-457200">
@@ -9733,31 +10677,19 @@
             </a:pPr>
             <a:r>
               <a:rPr lang="de-DE" sz="2400" dirty="0" smtClean="0"/>
-              <a:t>jeder </a:t>
+              <a:t>jeder Entwickler arbeitet an </a:t>
+            </a:r>
+            <a:r>
+              <a:rPr lang="de-DE" sz="2400" dirty="0" smtClean="0">
+                <a:solidFill>
+                  <a:srgbClr val="81D4FA"/>
+                </a:solidFill>
+              </a:rPr>
+              <a:t>lokaler Kopie </a:t>
             </a:r>
             <a:r>
               <a:rPr lang="de-DE" sz="2400" dirty="0" smtClean="0"/>
-              <a:t>Entwickler arbeitet </a:t>
-            </a:r>
-            <a:r>
-              <a:rPr lang="de-DE" sz="2400" dirty="0" smtClean="0"/>
-              <a:t>an </a:t>
-            </a:r>
-            <a:r>
-              <a:rPr lang="de-DE" sz="2400" dirty="0" smtClean="0">
-                <a:solidFill>
-                  <a:srgbClr val="81D4FA"/>
-                </a:solidFill>
-              </a:rPr>
-              <a:t>lokaler Kopie </a:t>
-            </a:r>
-            <a:r>
-              <a:rPr lang="de-DE" sz="2400" dirty="0" smtClean="0"/>
-              <a:t>des Projekts </a:t>
-            </a:r>
-            <a:r>
-              <a:rPr lang="de-DE" sz="2400" dirty="0" smtClean="0"/>
-              <a:t>(</a:t>
+              <a:t>des Projekts (</a:t>
             </a:r>
             <a:r>
               <a:rPr lang="de-DE" sz="2400" dirty="0" err="1" smtClean="0">
@@ -9798,15 +10730,7 @@
             </a:pPr>
             <a:r>
               <a:rPr lang="de-DE" sz="2400" dirty="0" smtClean="0"/>
-              <a:t>Änderungen werden </a:t>
-            </a:r>
-            <a:r>
-              <a:rPr lang="de-DE" sz="2400" dirty="0" smtClean="0"/>
-              <a:t>zusammengefasst und verwaltet </a:t>
-            </a:r>
-            <a:r>
-              <a:rPr lang="de-DE" sz="2400" dirty="0" smtClean="0"/>
-              <a:t>(</a:t>
+              <a:t>Änderungen werden zusammengefasst und verwaltet (</a:t>
             </a:r>
             <a:r>
               <a:rPr lang="de-DE" sz="2400" dirty="0" err="1" smtClean="0">
@@ -9851,15 +10775,7 @@
                   <a:srgbClr val="81D4FA"/>
                 </a:solidFill>
               </a:rPr>
-              <a:t>remote </a:t>
-            </a:r>
-            <a:r>
-              <a:rPr lang="en-US" sz="2400" dirty="0" smtClean="0">
-                <a:solidFill>
-                  <a:srgbClr val="81D4FA"/>
-                </a:solidFill>
-              </a:rPr>
-              <a:t>repositories </a:t>
+              <a:t>remote repositories </a:t>
             </a:r>
             <a:r>
               <a:rPr lang="en-US" sz="2400" dirty="0" err="1" smtClean="0"/>
@@ -9885,31 +10801,11 @@
                   <a:srgbClr val="81D4FA"/>
                 </a:solidFill>
               </a:rPr>
-              <a:t> </a:t>
-            </a:r>
-            <a:r>
-              <a:rPr lang="de-DE" sz="2400" dirty="0" smtClean="0">
-                <a:solidFill>
-                  <a:srgbClr val="81D4FA"/>
-                </a:solidFill>
-              </a:rPr>
-              <a:t>Änderungen anderer </a:t>
-            </a:r>
-            <a:r>
-              <a:rPr lang="de-DE" sz="2400" dirty="0" smtClean="0">
-                <a:solidFill>
-                  <a:srgbClr val="81D4FA"/>
-                </a:solidFill>
-              </a:rPr>
-              <a:t>Entwickler </a:t>
+              <a:t> Änderungen anderer Entwickler </a:t>
             </a:r>
             <a:r>
               <a:rPr lang="de-DE" sz="2400" dirty="0" smtClean="0"/>
-              <a:t>über </a:t>
-            </a:r>
-            <a:r>
-              <a:rPr lang="de-DE" sz="2400" dirty="0" smtClean="0"/>
-              <a:t>das remote </a:t>
+              <a:t>über das remote </a:t>
             </a:r>
             <a:r>
               <a:rPr lang="de-DE" sz="2400" dirty="0" err="1" smtClean="0"/>
@@ -10023,7 +10919,7 @@
         <p:spPr/>
         <p:txBody>
           <a:bodyPr>
-            <a:normAutofit/>
+            <a:normAutofit fontScale="92500" lnSpcReduction="10000"/>
           </a:bodyPr>
           <a:lstStyle/>
           <a:p>
@@ -10033,8 +10929,9 @@
             </a:r>
             <a:r>
               <a:rPr lang="en-US" dirty="0" smtClean="0"/>
-              <a:t>/Ubuntu</a:t>
-            </a:r>
+              <a:t>/Ubuntu und WSL</a:t>
+            </a:r>
+            <a:endParaRPr lang="en-US" dirty="0" smtClean="0"/>
           </a:p>
           <a:p>
             <a:endParaRPr lang="en-US" dirty="0"/>
@@ -10046,14 +10943,80 @@
             </a:r>
           </a:p>
           <a:p>
+            <a:pPr marL="342900" indent="-342900">
+              <a:buClr>
+                <a:srgbClr val="FFFF00"/>
+              </a:buClr>
+              <a:buFont typeface="Arial" panose="020B0604020202020204" pitchFamily="34" charset="0"/>
+              <a:buChar char="•"/>
+            </a:pPr>
+            <a:r>
+              <a:rPr lang="en-US" sz="2400" dirty="0" err="1" smtClean="0">
+                <a:solidFill>
+                  <a:srgbClr val="FFFF00"/>
+                </a:solidFill>
+              </a:rPr>
+              <a:t>git</a:t>
+            </a:r>
+            <a:r>
+              <a:rPr lang="en-US" sz="2400" dirty="0" smtClean="0">
+                <a:solidFill>
+                  <a:srgbClr val="FFFF00"/>
+                </a:solidFill>
+              </a:rPr>
+              <a:t> bash: https</a:t>
+            </a:r>
             <a:r>
               <a:rPr lang="en-US" sz="2400" dirty="0">
                 <a:solidFill>
                   <a:srgbClr val="FFFF00"/>
                 </a:solidFill>
               </a:rPr>
-              <a:t>https://git-scm.com/download/windows</a:t>
-            </a:r>
+              <a:t>://</a:t>
+            </a:r>
+            <a:r>
+              <a:rPr lang="en-US" sz="2400" dirty="0" smtClean="0">
+                <a:solidFill>
+                  <a:srgbClr val="FFFF00"/>
+                </a:solidFill>
+              </a:rPr>
+              <a:t>git-scm.com/download/windows  </a:t>
+            </a:r>
+            <a:endParaRPr lang="en-US" sz="2400" dirty="0">
+              <a:solidFill>
+                <a:srgbClr val="FFFF00"/>
+              </a:solidFill>
+            </a:endParaRPr>
+          </a:p>
+          <a:p>
+            <a:pPr marL="342900" indent="-342900">
+              <a:buClr>
+                <a:srgbClr val="FFFF00"/>
+              </a:buClr>
+              <a:buFont typeface="Arial" panose="020B0604020202020204" pitchFamily="34" charset="0"/>
+              <a:buChar char="•"/>
+            </a:pPr>
+            <a:r>
+              <a:rPr lang="en-US" sz="2400" dirty="0" smtClean="0">
+                <a:solidFill>
+                  <a:srgbClr val="FFFF00"/>
+                </a:solidFill>
+              </a:rPr>
+              <a:t>WSL (Windows Subsyste</a:t>
+            </a:r>
+            <a:r>
+              <a:rPr lang="en-US" sz="2400" dirty="0" smtClean="0">
+                <a:solidFill>
+                  <a:srgbClr val="FFFF00"/>
+                </a:solidFill>
+              </a:rPr>
+              <a:t>m for Linux)</a:t>
+            </a:r>
+            <a:endParaRPr lang="en-US" sz="2400" dirty="0">
+              <a:solidFill>
+                <a:srgbClr val="FFFF00"/>
+              </a:solidFill>
+            </a:endParaRPr>
           </a:p>
           <a:p>
             <a:r>
@@ -10120,7 +11083,7 @@
         </p:blipFill>
         <p:spPr bwMode="auto">
           <a:xfrm>
-            <a:off x="595312" y="1857375"/>
+            <a:off x="457200" y="1733550"/>
             <a:ext cx="3748088" cy="485775"/>
           </a:xfrm>
           <a:prstGeom prst="rect">

</xml_diff>